<commit_message>
Modified penn_station_data and slides
</commit_message>
<xml_diff>
--- a/project_1.pptx
+++ b/project_1.pptx
@@ -118,6 +118,11 @@
       </a:defRPr>
     </a:lvl9pPr>
   </p:defaultTextStyle>
+  <p:extLst>
+    <p:ext uri="{EFAFB233-063F-42B5-8137-9DF3F51BA10A}">
+      <p15:sldGuideLst xmlns:p15="http://schemas.microsoft.com/office/powerpoint/2012/main"/>
+    </p:ext>
+  </p:extLst>
 </p:presentation>
 </file>
 
@@ -203,7 +208,7 @@
           <a:p>
             <a:fld id="{E3E123FB-5F3F-3C42-8B26-8A312FEEC48A}" type="datetimeFigureOut">
               <a:rPr lang="en-US" smtClean="0"/>
-              <a:t>1/5/21</a:t>
+              <a:t>1/6/21</a:t>
             </a:fld>
             <a:endParaRPr lang="en-US"/>
           </a:p>
@@ -701,7 +706,7 @@
           <a:p>
             <a:fld id="{50D46B56-9E3B-8740-A4BC-96809780C61F}" type="datetimeFigureOut">
               <a:rPr lang="en-US" smtClean="0"/>
-              <a:t>1/5/21</a:t>
+              <a:t>1/6/21</a:t>
             </a:fld>
             <a:endParaRPr lang="en-US"/>
           </a:p>
@@ -899,7 +904,7 @@
           <a:p>
             <a:fld id="{50D46B56-9E3B-8740-A4BC-96809780C61F}" type="datetimeFigureOut">
               <a:rPr lang="en-US" smtClean="0"/>
-              <a:t>1/5/21</a:t>
+              <a:t>1/6/21</a:t>
             </a:fld>
             <a:endParaRPr lang="en-US"/>
           </a:p>
@@ -1107,7 +1112,7 @@
           <a:p>
             <a:fld id="{50D46B56-9E3B-8740-A4BC-96809780C61F}" type="datetimeFigureOut">
               <a:rPr lang="en-US" smtClean="0"/>
-              <a:t>1/5/21</a:t>
+              <a:t>1/6/21</a:t>
             </a:fld>
             <a:endParaRPr lang="en-US"/>
           </a:p>
@@ -1305,7 +1310,7 @@
           <a:p>
             <a:fld id="{50D46B56-9E3B-8740-A4BC-96809780C61F}" type="datetimeFigureOut">
               <a:rPr lang="en-US" smtClean="0"/>
-              <a:t>1/5/21</a:t>
+              <a:t>1/6/21</a:t>
             </a:fld>
             <a:endParaRPr lang="en-US"/>
           </a:p>
@@ -1580,7 +1585,7 @@
           <a:p>
             <a:fld id="{50D46B56-9E3B-8740-A4BC-96809780C61F}" type="datetimeFigureOut">
               <a:rPr lang="en-US" smtClean="0"/>
-              <a:t>1/5/21</a:t>
+              <a:t>1/6/21</a:t>
             </a:fld>
             <a:endParaRPr lang="en-US"/>
           </a:p>
@@ -1845,7 +1850,7 @@
           <a:p>
             <a:fld id="{50D46B56-9E3B-8740-A4BC-96809780C61F}" type="datetimeFigureOut">
               <a:rPr lang="en-US" smtClean="0"/>
-              <a:t>1/5/21</a:t>
+              <a:t>1/6/21</a:t>
             </a:fld>
             <a:endParaRPr lang="en-US"/>
           </a:p>
@@ -2257,7 +2262,7 @@
           <a:p>
             <a:fld id="{50D46B56-9E3B-8740-A4BC-96809780C61F}" type="datetimeFigureOut">
               <a:rPr lang="en-US" smtClean="0"/>
-              <a:t>1/5/21</a:t>
+              <a:t>1/6/21</a:t>
             </a:fld>
             <a:endParaRPr lang="en-US"/>
           </a:p>
@@ -2398,7 +2403,7 @@
           <a:p>
             <a:fld id="{50D46B56-9E3B-8740-A4BC-96809780C61F}" type="datetimeFigureOut">
               <a:rPr lang="en-US" smtClean="0"/>
-              <a:t>1/5/21</a:t>
+              <a:t>1/6/21</a:t>
             </a:fld>
             <a:endParaRPr lang="en-US"/>
           </a:p>
@@ -2511,7 +2516,7 @@
           <a:p>
             <a:fld id="{50D46B56-9E3B-8740-A4BC-96809780C61F}" type="datetimeFigureOut">
               <a:rPr lang="en-US" smtClean="0"/>
-              <a:t>1/5/21</a:t>
+              <a:t>1/6/21</a:t>
             </a:fld>
             <a:endParaRPr lang="en-US"/>
           </a:p>
@@ -2822,7 +2827,7 @@
           <a:p>
             <a:fld id="{50D46B56-9E3B-8740-A4BC-96809780C61F}" type="datetimeFigureOut">
               <a:rPr lang="en-US" smtClean="0"/>
-              <a:t>1/5/21</a:t>
+              <a:t>1/6/21</a:t>
             </a:fld>
             <a:endParaRPr lang="en-US"/>
           </a:p>
@@ -3110,7 +3115,7 @@
           <a:p>
             <a:fld id="{50D46B56-9E3B-8740-A4BC-96809780C61F}" type="datetimeFigureOut">
               <a:rPr lang="en-US" smtClean="0"/>
-              <a:t>1/5/21</a:t>
+              <a:t>1/6/21</a:t>
             </a:fld>
             <a:endParaRPr lang="en-US"/>
           </a:p>
@@ -3351,7 +3356,7 @@
           <a:p>
             <a:fld id="{50D46B56-9E3B-8740-A4BC-96809780C61F}" type="datetimeFigureOut">
               <a:rPr lang="en-US" smtClean="0"/>
-              <a:t>1/5/21</a:t>
+              <a:t>1/6/21</a:t>
             </a:fld>
             <a:endParaRPr lang="en-US"/>
           </a:p>
@@ -4967,7 +4972,7 @@
         </p:blipFill>
         <p:spPr>
           <a:xfrm>
-            <a:off x="3447818" y="2806700"/>
+            <a:off x="838200" y="2671763"/>
             <a:ext cx="4927600" cy="3505200"/>
           </a:xfrm>
           <a:prstGeom prst="rect">
@@ -4975,6 +4980,62 @@
           </a:prstGeom>
         </p:spPr>
       </p:pic>
+      <p:sp>
+        <p:nvSpPr>
+          <p:cNvPr id="4" name="Rectangle 3">
+            <a:extLst>
+              <a:ext uri="{FF2B5EF4-FFF2-40B4-BE49-F238E27FC236}">
+                <a16:creationId xmlns:a16="http://schemas.microsoft.com/office/drawing/2014/main" id="{612D98B4-6353-214E-B6DF-EB69D99C461B}"/>
+              </a:ext>
+            </a:extLst>
+          </p:cNvPr>
+          <p:cNvSpPr/>
+          <p:nvPr/>
+        </p:nvSpPr>
+        <p:spPr>
+          <a:xfrm>
+            <a:off x="6342927" y="2754775"/>
+            <a:ext cx="4849792" cy="3020992"/>
+          </a:xfrm>
+          <a:prstGeom prst="rect">
+            <a:avLst/>
+          </a:prstGeom>
+        </p:spPr>
+        <p:style>
+          <a:lnRef idx="2">
+            <a:schemeClr val="accent1">
+              <a:shade val="50000"/>
+            </a:schemeClr>
+          </a:lnRef>
+          <a:fillRef idx="1">
+            <a:schemeClr val="accent1"/>
+          </a:fillRef>
+          <a:effectRef idx="0">
+            <a:schemeClr val="accent1"/>
+          </a:effectRef>
+          <a:fontRef idx="minor">
+            <a:schemeClr val="lt1"/>
+          </a:fontRef>
+        </p:style>
+        <p:txBody>
+          <a:bodyPr rtlCol="0" anchor="ctr"/>
+          <a:lstStyle/>
+          <a:p>
+            <a:pPr algn="ctr"/>
+            <a:r>
+              <a:rPr lang="en-US" dirty="0"/>
+              <a:t>Rain plot (weekly commute for 8 weeks:</a:t>
+            </a:r>
+          </a:p>
+          <a:p>
+            <a:pPr algn="ctr"/>
+            <a:r>
+              <a:rPr lang="en-US" dirty="0"/>
+              <a:t>May-June 2018, 2019)</a:t>
+            </a:r>
+          </a:p>
+        </p:txBody>
+      </p:sp>
     </p:spTree>
     <p:extLst>
       <p:ext uri="{BB962C8B-B14F-4D97-AF65-F5344CB8AC3E}">

</xml_diff>

<commit_message>
Modified penn_station_data and slides2
</commit_message>
<xml_diff>
--- a/project_1.pptx
+++ b/project_1.pptx
@@ -11,8 +11,8 @@
     <p:sldId id="256" r:id="rId2"/>
     <p:sldId id="257" r:id="rId3"/>
     <p:sldId id="260" r:id="rId4"/>
-    <p:sldId id="258" r:id="rId5"/>
-    <p:sldId id="259" r:id="rId6"/>
+    <p:sldId id="259" r:id="rId5"/>
+    <p:sldId id="258" r:id="rId6"/>
     <p:sldId id="261" r:id="rId7"/>
     <p:sldId id="266" r:id="rId8"/>
     <p:sldId id="262" r:id="rId9"/>
@@ -4899,178 +4899,6 @@
           <p:cNvPr id="2" name="Title 1">
             <a:extLst>
               <a:ext uri="{FF2B5EF4-FFF2-40B4-BE49-F238E27FC236}">
-                <a16:creationId xmlns:a16="http://schemas.microsoft.com/office/drawing/2014/main" id="{A0A30823-0FFA-A74C-87E1-87F690F6E0C3}"/>
-              </a:ext>
-            </a:extLst>
-          </p:cNvPr>
-          <p:cNvSpPr>
-            <a:spLocks noGrp="1"/>
-          </p:cNvSpPr>
-          <p:nvPr>
-            <p:ph type="title"/>
-          </p:nvPr>
-        </p:nvSpPr>
-        <p:spPr/>
-        <p:txBody>
-          <a:bodyPr/>
-          <a:lstStyle/>
-          <a:p>
-            <a:r>
-              <a:rPr lang="en-US" dirty="0"/>
-              <a:t>MTA traffic every day</a:t>
-            </a:r>
-          </a:p>
-        </p:txBody>
-      </p:sp>
-      <p:sp>
-        <p:nvSpPr>
-          <p:cNvPr id="3" name="Content Placeholder 2">
-            <a:extLst>
-              <a:ext uri="{FF2B5EF4-FFF2-40B4-BE49-F238E27FC236}">
-                <a16:creationId xmlns:a16="http://schemas.microsoft.com/office/drawing/2014/main" id="{5507B125-A01B-CA45-9794-D799BB36E534}"/>
-              </a:ext>
-            </a:extLst>
-          </p:cNvPr>
-          <p:cNvSpPr>
-            <a:spLocks noGrp="1"/>
-          </p:cNvSpPr>
-          <p:nvPr>
-            <p:ph idx="1"/>
-          </p:nvPr>
-        </p:nvSpPr>
-        <p:spPr/>
-        <p:txBody>
-          <a:bodyPr/>
-          <a:lstStyle/>
-          <a:p>
-            <a:r>
-              <a:rPr lang="en-US" dirty="0"/>
-              <a:t>Weekdays &gt; weekends</a:t>
-            </a:r>
-          </a:p>
-        </p:txBody>
-      </p:sp>
-      <p:pic>
-        <p:nvPicPr>
-          <p:cNvPr id="7" name="Picture 6">
-            <a:extLst>
-              <a:ext uri="{FF2B5EF4-FFF2-40B4-BE49-F238E27FC236}">
-                <a16:creationId xmlns:a16="http://schemas.microsoft.com/office/drawing/2014/main" id="{C55365E7-2520-7F4A-9598-7816709E201E}"/>
-              </a:ext>
-            </a:extLst>
-          </p:cNvPr>
-          <p:cNvPicPr>
-            <a:picLocks noChangeAspect="1"/>
-          </p:cNvPicPr>
-          <p:nvPr/>
-        </p:nvPicPr>
-        <p:blipFill>
-          <a:blip r:embed="rId2"/>
-          <a:stretch>
-            <a:fillRect/>
-          </a:stretch>
-        </p:blipFill>
-        <p:spPr>
-          <a:xfrm>
-            <a:off x="838200" y="2671763"/>
-            <a:ext cx="4927600" cy="3505200"/>
-          </a:xfrm>
-          <a:prstGeom prst="rect">
-            <a:avLst/>
-          </a:prstGeom>
-        </p:spPr>
-      </p:pic>
-      <p:sp>
-        <p:nvSpPr>
-          <p:cNvPr id="4" name="Rectangle 3">
-            <a:extLst>
-              <a:ext uri="{FF2B5EF4-FFF2-40B4-BE49-F238E27FC236}">
-                <a16:creationId xmlns:a16="http://schemas.microsoft.com/office/drawing/2014/main" id="{612D98B4-6353-214E-B6DF-EB69D99C461B}"/>
-              </a:ext>
-            </a:extLst>
-          </p:cNvPr>
-          <p:cNvSpPr/>
-          <p:nvPr/>
-        </p:nvSpPr>
-        <p:spPr>
-          <a:xfrm>
-            <a:off x="6342927" y="2754775"/>
-            <a:ext cx="4849792" cy="3020992"/>
-          </a:xfrm>
-          <a:prstGeom prst="rect">
-            <a:avLst/>
-          </a:prstGeom>
-        </p:spPr>
-        <p:style>
-          <a:lnRef idx="2">
-            <a:schemeClr val="accent1">
-              <a:shade val="50000"/>
-            </a:schemeClr>
-          </a:lnRef>
-          <a:fillRef idx="1">
-            <a:schemeClr val="accent1"/>
-          </a:fillRef>
-          <a:effectRef idx="0">
-            <a:schemeClr val="accent1"/>
-          </a:effectRef>
-          <a:fontRef idx="minor">
-            <a:schemeClr val="lt1"/>
-          </a:fontRef>
-        </p:style>
-        <p:txBody>
-          <a:bodyPr rtlCol="0" anchor="ctr"/>
-          <a:lstStyle/>
-          <a:p>
-            <a:pPr algn="ctr"/>
-            <a:r>
-              <a:rPr lang="en-US" dirty="0"/>
-              <a:t>Rain plot (weekly commute for 8 weeks:</a:t>
-            </a:r>
-          </a:p>
-          <a:p>
-            <a:pPr algn="ctr"/>
-            <a:r>
-              <a:rPr lang="en-US" dirty="0"/>
-              <a:t>May-June 2018, 2019)</a:t>
-            </a:r>
-          </a:p>
-        </p:txBody>
-      </p:sp>
-    </p:spTree>
-    <p:extLst>
-      <p:ext uri="{BB962C8B-B14F-4D97-AF65-F5344CB8AC3E}">
-        <p14:creationId xmlns:p14="http://schemas.microsoft.com/office/powerpoint/2010/main" val="350218843"/>
-      </p:ext>
-    </p:extLst>
-  </p:cSld>
-  <p:clrMapOvr>
-    <a:masterClrMapping/>
-  </p:clrMapOvr>
-</p:sld>
-</file>
-
-<file path=ppt/slides/slide5.xml><?xml version="1.0" encoding="utf-8"?>
-<p:sld xmlns:a="http://schemas.openxmlformats.org/drawingml/2006/main" xmlns:r="http://schemas.openxmlformats.org/officeDocument/2006/relationships" xmlns:p="http://schemas.openxmlformats.org/presentationml/2006/main">
-  <p:cSld>
-    <p:spTree>
-      <p:nvGrpSpPr>
-        <p:cNvPr id="1" name=""/>
-        <p:cNvGrpSpPr/>
-        <p:nvPr/>
-      </p:nvGrpSpPr>
-      <p:grpSpPr>
-        <a:xfrm>
-          <a:off x="0" y="0"/>
-          <a:ext cx="0" cy="0"/>
-          <a:chOff x="0" y="0"/>
-          <a:chExt cx="0" cy="0"/>
-        </a:xfrm>
-      </p:grpSpPr>
-      <p:sp>
-        <p:nvSpPr>
-          <p:cNvPr id="2" name="Title 1">
-            <a:extLst>
-              <a:ext uri="{FF2B5EF4-FFF2-40B4-BE49-F238E27FC236}">
                 <a16:creationId xmlns:a16="http://schemas.microsoft.com/office/drawing/2014/main" id="{3A7C735F-F13E-914E-9DF6-F21C621A14CD}"/>
               </a:ext>
             </a:extLst>
@@ -5194,6 +5022,178 @@
     <p:extLst>
       <p:ext uri="{BB962C8B-B14F-4D97-AF65-F5344CB8AC3E}">
         <p14:creationId xmlns:p14="http://schemas.microsoft.com/office/powerpoint/2010/main" val="3390044281"/>
+      </p:ext>
+    </p:extLst>
+  </p:cSld>
+  <p:clrMapOvr>
+    <a:masterClrMapping/>
+  </p:clrMapOvr>
+</p:sld>
+</file>
+
+<file path=ppt/slides/slide5.xml><?xml version="1.0" encoding="utf-8"?>
+<p:sld xmlns:a="http://schemas.openxmlformats.org/drawingml/2006/main" xmlns:r="http://schemas.openxmlformats.org/officeDocument/2006/relationships" xmlns:p="http://schemas.openxmlformats.org/presentationml/2006/main">
+  <p:cSld>
+    <p:spTree>
+      <p:nvGrpSpPr>
+        <p:cNvPr id="1" name=""/>
+        <p:cNvGrpSpPr/>
+        <p:nvPr/>
+      </p:nvGrpSpPr>
+      <p:grpSpPr>
+        <a:xfrm>
+          <a:off x="0" y="0"/>
+          <a:ext cx="0" cy="0"/>
+          <a:chOff x="0" y="0"/>
+          <a:chExt cx="0" cy="0"/>
+        </a:xfrm>
+      </p:grpSpPr>
+      <p:sp>
+        <p:nvSpPr>
+          <p:cNvPr id="2" name="Title 1">
+            <a:extLst>
+              <a:ext uri="{FF2B5EF4-FFF2-40B4-BE49-F238E27FC236}">
+                <a16:creationId xmlns:a16="http://schemas.microsoft.com/office/drawing/2014/main" id="{A0A30823-0FFA-A74C-87E1-87F690F6E0C3}"/>
+              </a:ext>
+            </a:extLst>
+          </p:cNvPr>
+          <p:cNvSpPr>
+            <a:spLocks noGrp="1"/>
+          </p:cNvSpPr>
+          <p:nvPr>
+            <p:ph type="title"/>
+          </p:nvPr>
+        </p:nvSpPr>
+        <p:spPr/>
+        <p:txBody>
+          <a:bodyPr/>
+          <a:lstStyle/>
+          <a:p>
+            <a:r>
+              <a:rPr lang="en-US" dirty="0"/>
+              <a:t>MTA traffic every day</a:t>
+            </a:r>
+          </a:p>
+        </p:txBody>
+      </p:sp>
+      <p:sp>
+        <p:nvSpPr>
+          <p:cNvPr id="3" name="Content Placeholder 2">
+            <a:extLst>
+              <a:ext uri="{FF2B5EF4-FFF2-40B4-BE49-F238E27FC236}">
+                <a16:creationId xmlns:a16="http://schemas.microsoft.com/office/drawing/2014/main" id="{5507B125-A01B-CA45-9794-D799BB36E534}"/>
+              </a:ext>
+            </a:extLst>
+          </p:cNvPr>
+          <p:cNvSpPr>
+            <a:spLocks noGrp="1"/>
+          </p:cNvSpPr>
+          <p:nvPr>
+            <p:ph idx="1"/>
+          </p:nvPr>
+        </p:nvSpPr>
+        <p:spPr/>
+        <p:txBody>
+          <a:bodyPr/>
+          <a:lstStyle/>
+          <a:p>
+            <a:r>
+              <a:rPr lang="en-US" dirty="0"/>
+              <a:t>Weekdays &gt; weekends</a:t>
+            </a:r>
+          </a:p>
+        </p:txBody>
+      </p:sp>
+      <p:pic>
+        <p:nvPicPr>
+          <p:cNvPr id="7" name="Picture 6">
+            <a:extLst>
+              <a:ext uri="{FF2B5EF4-FFF2-40B4-BE49-F238E27FC236}">
+                <a16:creationId xmlns:a16="http://schemas.microsoft.com/office/drawing/2014/main" id="{C55365E7-2520-7F4A-9598-7816709E201E}"/>
+              </a:ext>
+            </a:extLst>
+          </p:cNvPr>
+          <p:cNvPicPr>
+            <a:picLocks noChangeAspect="1"/>
+          </p:cNvPicPr>
+          <p:nvPr/>
+        </p:nvPicPr>
+        <p:blipFill>
+          <a:blip r:embed="rId2"/>
+          <a:stretch>
+            <a:fillRect/>
+          </a:stretch>
+        </p:blipFill>
+        <p:spPr>
+          <a:xfrm>
+            <a:off x="838200" y="2671763"/>
+            <a:ext cx="4927600" cy="3505200"/>
+          </a:xfrm>
+          <a:prstGeom prst="rect">
+            <a:avLst/>
+          </a:prstGeom>
+        </p:spPr>
+      </p:pic>
+      <p:sp>
+        <p:nvSpPr>
+          <p:cNvPr id="4" name="Rectangle 3">
+            <a:extLst>
+              <a:ext uri="{FF2B5EF4-FFF2-40B4-BE49-F238E27FC236}">
+                <a16:creationId xmlns:a16="http://schemas.microsoft.com/office/drawing/2014/main" id="{612D98B4-6353-214E-B6DF-EB69D99C461B}"/>
+              </a:ext>
+            </a:extLst>
+          </p:cNvPr>
+          <p:cNvSpPr/>
+          <p:nvPr/>
+        </p:nvSpPr>
+        <p:spPr>
+          <a:xfrm>
+            <a:off x="6342927" y="2754775"/>
+            <a:ext cx="4849792" cy="3020992"/>
+          </a:xfrm>
+          <a:prstGeom prst="rect">
+            <a:avLst/>
+          </a:prstGeom>
+        </p:spPr>
+        <p:style>
+          <a:lnRef idx="2">
+            <a:schemeClr val="accent1">
+              <a:shade val="50000"/>
+            </a:schemeClr>
+          </a:lnRef>
+          <a:fillRef idx="1">
+            <a:schemeClr val="accent1"/>
+          </a:fillRef>
+          <a:effectRef idx="0">
+            <a:schemeClr val="accent1"/>
+          </a:effectRef>
+          <a:fontRef idx="minor">
+            <a:schemeClr val="lt1"/>
+          </a:fontRef>
+        </p:style>
+        <p:txBody>
+          <a:bodyPr rtlCol="0" anchor="ctr"/>
+          <a:lstStyle/>
+          <a:p>
+            <a:pPr algn="ctr"/>
+            <a:r>
+              <a:rPr lang="en-US" dirty="0"/>
+              <a:t>Rain plot (weekly commute for 8 weeks:</a:t>
+            </a:r>
+          </a:p>
+          <a:p>
+            <a:pPr algn="ctr"/>
+            <a:r>
+              <a:rPr lang="en-US" dirty="0"/>
+              <a:t>May-June 2018, 2019)</a:t>
+            </a:r>
+          </a:p>
+        </p:txBody>
+      </p:sp>
+    </p:spTree>
+    <p:extLst>
+      <p:ext uri="{BB962C8B-B14F-4D97-AF65-F5344CB8AC3E}">
+        <p14:creationId xmlns:p14="http://schemas.microsoft.com/office/powerpoint/2010/main" val="350218843"/>
       </p:ext>
     </p:extLst>
   </p:cSld>

</xml_diff>

<commit_message>
Added memo in slides
Feel free to add stuff or important points to mention in the presentation!
</commit_message>
<xml_diff>
--- a/project_1.pptx
+++ b/project_1.pptx
@@ -5,21 +5,22 @@
     <p:sldMasterId id="2147483648" r:id="rId1"/>
   </p:sldMasterIdLst>
   <p:notesMasterIdLst>
-    <p:notesMasterId r:id="rId14"/>
+    <p:notesMasterId r:id="rId15"/>
   </p:notesMasterIdLst>
   <p:sldIdLst>
     <p:sldId id="256" r:id="rId2"/>
     <p:sldId id="257" r:id="rId3"/>
-    <p:sldId id="260" r:id="rId4"/>
-    <p:sldId id="259" r:id="rId5"/>
-    <p:sldId id="258" r:id="rId6"/>
-    <p:sldId id="261" r:id="rId7"/>
-    <p:sldId id="266" r:id="rId8"/>
-    <p:sldId id="262" r:id="rId9"/>
-    <p:sldId id="263" r:id="rId10"/>
-    <p:sldId id="264" r:id="rId11"/>
-    <p:sldId id="265" r:id="rId12"/>
-    <p:sldId id="267" r:id="rId13"/>
+    <p:sldId id="268" r:id="rId4"/>
+    <p:sldId id="260" r:id="rId5"/>
+    <p:sldId id="259" r:id="rId6"/>
+    <p:sldId id="258" r:id="rId7"/>
+    <p:sldId id="261" r:id="rId8"/>
+    <p:sldId id="266" r:id="rId9"/>
+    <p:sldId id="262" r:id="rId10"/>
+    <p:sldId id="263" r:id="rId11"/>
+    <p:sldId id="264" r:id="rId12"/>
+    <p:sldId id="265" r:id="rId13"/>
+    <p:sldId id="267" r:id="rId14"/>
   </p:sldIdLst>
   <p:sldSz cx="12192000" cy="6858000"/>
   <p:notesSz cx="6858000" cy="9144000"/>
@@ -540,7 +541,7 @@
           <a:p>
             <a:fld id="{EB87624E-D442-5F43-B52E-FAC3222C328E}" type="slidenum">
               <a:rPr lang="en-US" smtClean="0"/>
-              <a:t>8</a:t>
+              <a:t>9</a:t>
             </a:fld>
             <a:endParaRPr lang="en-US"/>
           </a:p>
@@ -3899,6 +3900,195 @@
           <a:p>
             <a:r>
               <a:rPr lang="en-US" dirty="0"/>
+              <a:t>Who loves galas!</a:t>
+            </a:r>
+          </a:p>
+        </p:txBody>
+      </p:sp>
+      <p:pic>
+        <p:nvPicPr>
+          <p:cNvPr id="5" name="Picture 4">
+            <a:extLst>
+              <a:ext uri="{FF2B5EF4-FFF2-40B4-BE49-F238E27FC236}">
+                <a16:creationId xmlns:a16="http://schemas.microsoft.com/office/drawing/2014/main" id="{2708C00D-9E06-A94A-B4FC-95E4C9DB326D}"/>
+              </a:ext>
+            </a:extLst>
+          </p:cNvPr>
+          <p:cNvPicPr>
+            <a:picLocks noChangeAspect="1"/>
+          </p:cNvPicPr>
+          <p:nvPr/>
+        </p:nvPicPr>
+        <p:blipFill>
+          <a:blip r:embed="rId2">
+            <a:alphaModFix amt="51000"/>
+          </a:blip>
+          <a:stretch>
+            <a:fillRect/>
+          </a:stretch>
+        </p:blipFill>
+        <p:spPr>
+          <a:xfrm>
+            <a:off x="6677525" y="700159"/>
+            <a:ext cx="5105400" cy="5804913"/>
+          </a:xfrm>
+          <a:prstGeom prst="rect">
+            <a:avLst/>
+          </a:prstGeom>
+        </p:spPr>
+      </p:pic>
+      <p:sp>
+        <p:nvSpPr>
+          <p:cNvPr id="6" name="Rectangle 5">
+            <a:extLst>
+              <a:ext uri="{FF2B5EF4-FFF2-40B4-BE49-F238E27FC236}">
+                <a16:creationId xmlns:a16="http://schemas.microsoft.com/office/drawing/2014/main" id="{E59A46B5-6D6D-6C43-BB51-11E6B3645423}"/>
+              </a:ext>
+            </a:extLst>
+          </p:cNvPr>
+          <p:cNvSpPr/>
+          <p:nvPr/>
+        </p:nvSpPr>
+        <p:spPr>
+          <a:xfrm>
+            <a:off x="6677525" y="700159"/>
+            <a:ext cx="5105400" cy="5804913"/>
+          </a:xfrm>
+          <a:prstGeom prst="rect">
+            <a:avLst/>
+          </a:prstGeom>
+          <a:solidFill>
+            <a:schemeClr val="accent6">
+              <a:lumMod val="60000"/>
+              <a:lumOff val="40000"/>
+              <a:alpha val="39000"/>
+            </a:schemeClr>
+          </a:solidFill>
+          <a:ln>
+            <a:noFill/>
+          </a:ln>
+        </p:spPr>
+        <p:style>
+          <a:lnRef idx="2">
+            <a:schemeClr val="accent1">
+              <a:shade val="50000"/>
+            </a:schemeClr>
+          </a:lnRef>
+          <a:fillRef idx="1">
+            <a:schemeClr val="accent1"/>
+          </a:fillRef>
+          <a:effectRef idx="0">
+            <a:schemeClr val="accent1"/>
+          </a:effectRef>
+          <a:fontRef idx="minor">
+            <a:schemeClr val="lt1"/>
+          </a:fontRef>
+        </p:style>
+        <p:txBody>
+          <a:bodyPr rtlCol="0" anchor="ctr"/>
+          <a:lstStyle/>
+          <a:p>
+            <a:pPr algn="ctr"/>
+            <a:endParaRPr lang="en-US"/>
+          </a:p>
+        </p:txBody>
+      </p:sp>
+      <p:sp>
+        <p:nvSpPr>
+          <p:cNvPr id="3" name="Content Placeholder 2">
+            <a:extLst>
+              <a:ext uri="{FF2B5EF4-FFF2-40B4-BE49-F238E27FC236}">
+                <a16:creationId xmlns:a16="http://schemas.microsoft.com/office/drawing/2014/main" id="{EF829C52-42D1-F84E-80E7-E475E1E9FD8B}"/>
+              </a:ext>
+            </a:extLst>
+          </p:cNvPr>
+          <p:cNvSpPr>
+            <a:spLocks noGrp="1"/>
+          </p:cNvSpPr>
+          <p:nvPr>
+            <p:ph idx="1"/>
+          </p:nvPr>
+        </p:nvSpPr>
+        <p:spPr/>
+        <p:txBody>
+          <a:bodyPr/>
+          <a:lstStyle/>
+          <a:p>
+            <a:r>
+              <a:rPr lang="en-US" dirty="0"/>
+              <a:t>Cost of living in NYC</a:t>
+            </a:r>
+          </a:p>
+          <a:p>
+            <a:r>
+              <a:rPr lang="en-US" dirty="0"/>
+              <a:t>Bar chart of (zip code, count of income&gt;75k)</a:t>
+            </a:r>
+          </a:p>
+          <a:p>
+            <a:r>
+              <a:rPr lang="en-US" dirty="0"/>
+              <a:t>Map of NYC + highest income areas</a:t>
+            </a:r>
+          </a:p>
+          <a:p>
+            <a:endParaRPr lang="en-US" dirty="0"/>
+          </a:p>
+        </p:txBody>
+      </p:sp>
+    </p:spTree>
+    <p:extLst>
+      <p:ext uri="{BB962C8B-B14F-4D97-AF65-F5344CB8AC3E}">
+        <p14:creationId xmlns:p14="http://schemas.microsoft.com/office/powerpoint/2010/main" val="4150064823"/>
+      </p:ext>
+    </p:extLst>
+  </p:cSld>
+  <p:clrMapOvr>
+    <a:masterClrMapping/>
+  </p:clrMapOvr>
+</p:sld>
+</file>
+
+<file path=ppt/slides/slide11.xml><?xml version="1.0" encoding="utf-8"?>
+<p:sld xmlns:a="http://schemas.openxmlformats.org/drawingml/2006/main" xmlns:r="http://schemas.openxmlformats.org/officeDocument/2006/relationships" xmlns:p="http://schemas.openxmlformats.org/presentationml/2006/main">
+  <p:cSld>
+    <p:spTree>
+      <p:nvGrpSpPr>
+        <p:cNvPr id="1" name=""/>
+        <p:cNvGrpSpPr/>
+        <p:nvPr/>
+      </p:nvGrpSpPr>
+      <p:grpSpPr>
+        <a:xfrm>
+          <a:off x="0" y="0"/>
+          <a:ext cx="0" cy="0"/>
+          <a:chOff x="0" y="0"/>
+          <a:chExt cx="0" cy="0"/>
+        </a:xfrm>
+      </p:grpSpPr>
+      <p:sp>
+        <p:nvSpPr>
+          <p:cNvPr id="2" name="Title 1">
+            <a:extLst>
+              <a:ext uri="{FF2B5EF4-FFF2-40B4-BE49-F238E27FC236}">
+                <a16:creationId xmlns:a16="http://schemas.microsoft.com/office/drawing/2014/main" id="{3A7C735F-F13E-914E-9DF6-F21C621A14CD}"/>
+              </a:ext>
+            </a:extLst>
+          </p:cNvPr>
+          <p:cNvSpPr>
+            <a:spLocks noGrp="1"/>
+          </p:cNvSpPr>
+          <p:nvPr>
+            <p:ph type="title"/>
+          </p:nvPr>
+        </p:nvSpPr>
+        <p:spPr/>
+        <p:txBody>
+          <a:bodyPr/>
+          <a:lstStyle/>
+          <a:p>
+            <a:r>
+              <a:rPr lang="en-US" dirty="0"/>
               <a:t>Who loves tech?</a:t>
             </a:r>
           </a:p>
@@ -4033,7 +4223,7 @@
 </p:sld>
 </file>
 
-<file path=ppt/slides/slide11.xml><?xml version="1.0" encoding="utf-8"?>
+<file path=ppt/slides/slide12.xml><?xml version="1.0" encoding="utf-8"?>
 <p:sld xmlns:a="http://schemas.openxmlformats.org/drawingml/2006/main" xmlns:r="http://schemas.openxmlformats.org/officeDocument/2006/relationships" xmlns:p="http://schemas.openxmlformats.org/presentationml/2006/main">
   <p:cSld>
     <p:spTree>
@@ -4297,7 +4487,7 @@
 </p:sld>
 </file>
 
-<file path=ppt/slides/slide12.xml><?xml version="1.0" encoding="utf-8"?>
+<file path=ppt/slides/slide13.xml><?xml version="1.0" encoding="utf-8"?>
 <p:sld xmlns:a="http://schemas.openxmlformats.org/drawingml/2006/main" xmlns:r="http://schemas.openxmlformats.org/officeDocument/2006/relationships" xmlns:p="http://schemas.openxmlformats.org/presentationml/2006/main">
   <p:cSld>
     <p:spTree>
@@ -4777,6 +4967,12 @@
             </a:r>
           </a:p>
           <a:p>
+            <a:r>
+              <a:rPr lang="en-US" dirty="0"/>
+              <a:t>Scenario: 20 people from street team</a:t>
+            </a:r>
+          </a:p>
+          <a:p>
             <a:endParaRPr lang="en-US" dirty="0"/>
           </a:p>
         </p:txBody>
@@ -4816,7 +5012,7 @@
           <p:cNvPr id="2" name="Title 1">
             <a:extLst>
               <a:ext uri="{FF2B5EF4-FFF2-40B4-BE49-F238E27FC236}">
-                <a16:creationId xmlns:a16="http://schemas.microsoft.com/office/drawing/2014/main" id="{BD80C007-3B6C-C34A-951A-775C23A2E442}"/>
+                <a16:creationId xmlns:a16="http://schemas.microsoft.com/office/drawing/2014/main" id="{3884C5DA-3EDA-1F42-BC0F-D5AECF141C05}"/>
               </a:ext>
             </a:extLst>
           </p:cNvPr>
@@ -4834,31 +5030,78 @@
           <a:p>
             <a:r>
               <a:rPr lang="en-US" dirty="0"/>
-              <a:t>Hottest when and where</a:t>
-            </a:r>
-          </a:p>
-        </p:txBody>
-      </p:sp>
-      <p:sp>
-        <p:nvSpPr>
-          <p:cNvPr id="3" name="Text Placeholder 2">
-            <a:extLst>
-              <a:ext uri="{FF2B5EF4-FFF2-40B4-BE49-F238E27FC236}">
-                <a16:creationId xmlns:a16="http://schemas.microsoft.com/office/drawing/2014/main" id="{766D1216-1595-B741-887F-43AC6439A524}"/>
-              </a:ext>
-            </a:extLst>
-          </p:cNvPr>
-          <p:cNvSpPr>
-            <a:spLocks noGrp="1"/>
-          </p:cNvSpPr>
-          <p:nvPr>
-            <p:ph type="body" idx="1"/>
+              <a:t>Data sources</a:t>
+            </a:r>
+          </a:p>
+        </p:txBody>
+      </p:sp>
+      <p:sp>
+        <p:nvSpPr>
+          <p:cNvPr id="3" name="Content Placeholder 2">
+            <a:extLst>
+              <a:ext uri="{FF2B5EF4-FFF2-40B4-BE49-F238E27FC236}">
+                <a16:creationId xmlns:a16="http://schemas.microsoft.com/office/drawing/2014/main" id="{85239444-69EC-D242-B1D7-85F99EF4F3CC}"/>
+              </a:ext>
+            </a:extLst>
+          </p:cNvPr>
+          <p:cNvSpPr>
+            <a:spLocks noGrp="1"/>
+          </p:cNvSpPr>
+          <p:nvPr>
+            <p:ph idx="1"/>
           </p:nvPr>
         </p:nvSpPr>
         <p:spPr/>
         <p:txBody>
           <a:bodyPr/>
           <a:lstStyle/>
+          <a:p>
+            <a:r>
+              <a:rPr lang="en-US" dirty="0"/>
+              <a:t>2018-2019 May/June </a:t>
+            </a:r>
+            <a:r>
+              <a:rPr lang="en-US" dirty="0" err="1"/>
+              <a:t>mta</a:t>
+            </a:r>
+            <a:r>
+              <a:rPr lang="en-US" dirty="0"/>
+              <a:t> turnstile data (</a:t>
+            </a:r>
+            <a:r>
+              <a:rPr lang="en-US" dirty="0" err="1"/>
+              <a:t>mta.info</a:t>
+            </a:r>
+            <a:r>
+              <a:rPr lang="en-US" dirty="0"/>
+              <a:t>)</a:t>
+            </a:r>
+          </a:p>
+          <a:p>
+            <a:r>
+              <a:rPr lang="en-US" dirty="0" err="1"/>
+              <a:t>mta</a:t>
+            </a:r>
+            <a:r>
+              <a:rPr lang="en-US" dirty="0"/>
+              <a:t> station info</a:t>
+            </a:r>
+          </a:p>
+          <a:p>
+            <a:r>
+              <a:rPr lang="en-US" dirty="0"/>
+              <a:t>IRS by zip code</a:t>
+            </a:r>
+          </a:p>
+          <a:p>
+            <a:r>
+              <a:rPr lang="en-US" dirty="0"/>
+              <a:t>locations of 5 large tech companies and universities</a:t>
+            </a:r>
+          </a:p>
+          <a:p>
+            <a:endParaRPr lang="en-US" dirty="0"/>
+          </a:p>
           <a:p>
             <a:endParaRPr lang="en-US" dirty="0"/>
           </a:p>
@@ -4867,7 +5110,7 @@
     </p:spTree>
     <p:extLst>
       <p:ext uri="{BB962C8B-B14F-4D97-AF65-F5344CB8AC3E}">
-        <p14:creationId xmlns:p14="http://schemas.microsoft.com/office/powerpoint/2010/main" val="3361835584"/>
+        <p14:creationId xmlns:p14="http://schemas.microsoft.com/office/powerpoint/2010/main" val="2424158664"/>
       </p:ext>
     </p:extLst>
   </p:cSld>
@@ -4899,6 +5142,89 @@
           <p:cNvPr id="2" name="Title 1">
             <a:extLst>
               <a:ext uri="{FF2B5EF4-FFF2-40B4-BE49-F238E27FC236}">
+                <a16:creationId xmlns:a16="http://schemas.microsoft.com/office/drawing/2014/main" id="{BD80C007-3B6C-C34A-951A-775C23A2E442}"/>
+              </a:ext>
+            </a:extLst>
+          </p:cNvPr>
+          <p:cNvSpPr>
+            <a:spLocks noGrp="1"/>
+          </p:cNvSpPr>
+          <p:nvPr>
+            <p:ph type="title"/>
+          </p:nvPr>
+        </p:nvSpPr>
+        <p:spPr/>
+        <p:txBody>
+          <a:bodyPr/>
+          <a:lstStyle/>
+          <a:p>
+            <a:r>
+              <a:rPr lang="en-US" dirty="0"/>
+              <a:t>Hottest when and where</a:t>
+            </a:r>
+          </a:p>
+        </p:txBody>
+      </p:sp>
+      <p:sp>
+        <p:nvSpPr>
+          <p:cNvPr id="3" name="Text Placeholder 2">
+            <a:extLst>
+              <a:ext uri="{FF2B5EF4-FFF2-40B4-BE49-F238E27FC236}">
+                <a16:creationId xmlns:a16="http://schemas.microsoft.com/office/drawing/2014/main" id="{766D1216-1595-B741-887F-43AC6439A524}"/>
+              </a:ext>
+            </a:extLst>
+          </p:cNvPr>
+          <p:cNvSpPr>
+            <a:spLocks noGrp="1"/>
+          </p:cNvSpPr>
+          <p:nvPr>
+            <p:ph type="body" idx="1"/>
+          </p:nvPr>
+        </p:nvSpPr>
+        <p:spPr/>
+        <p:txBody>
+          <a:bodyPr/>
+          <a:lstStyle/>
+          <a:p>
+            <a:endParaRPr lang="en-US" dirty="0"/>
+          </a:p>
+        </p:txBody>
+      </p:sp>
+    </p:spTree>
+    <p:extLst>
+      <p:ext uri="{BB962C8B-B14F-4D97-AF65-F5344CB8AC3E}">
+        <p14:creationId xmlns:p14="http://schemas.microsoft.com/office/powerpoint/2010/main" val="3361835584"/>
+      </p:ext>
+    </p:extLst>
+  </p:cSld>
+  <p:clrMapOvr>
+    <a:masterClrMapping/>
+  </p:clrMapOvr>
+</p:sld>
+</file>
+
+<file path=ppt/slides/slide5.xml><?xml version="1.0" encoding="utf-8"?>
+<p:sld xmlns:a="http://schemas.openxmlformats.org/drawingml/2006/main" xmlns:r="http://schemas.openxmlformats.org/officeDocument/2006/relationships" xmlns:p="http://schemas.openxmlformats.org/presentationml/2006/main">
+  <p:cSld>
+    <p:spTree>
+      <p:nvGrpSpPr>
+        <p:cNvPr id="1" name=""/>
+        <p:cNvGrpSpPr/>
+        <p:nvPr/>
+      </p:nvGrpSpPr>
+      <p:grpSpPr>
+        <a:xfrm>
+          <a:off x="0" y="0"/>
+          <a:ext cx="0" cy="0"/>
+          <a:chOff x="0" y="0"/>
+          <a:chExt cx="0" cy="0"/>
+        </a:xfrm>
+      </p:grpSpPr>
+      <p:sp>
+        <p:nvSpPr>
+          <p:cNvPr id="2" name="Title 1">
+            <a:extLst>
+              <a:ext uri="{FF2B5EF4-FFF2-40B4-BE49-F238E27FC236}">
                 <a16:creationId xmlns:a16="http://schemas.microsoft.com/office/drawing/2014/main" id="{3A7C735F-F13E-914E-9DF6-F21C621A14CD}"/>
               </a:ext>
             </a:extLst>
@@ -4938,7 +5264,12 @@
             <p:ph idx="1"/>
           </p:nvPr>
         </p:nvSpPr>
-        <p:spPr/>
+        <p:spPr>
+          <a:xfrm>
+            <a:off x="838200" y="1574158"/>
+            <a:ext cx="10515600" cy="4602806"/>
+          </a:xfrm>
+        </p:spPr>
         <p:txBody>
           <a:bodyPr/>
           <a:lstStyle/>
@@ -4952,6 +5283,12 @@
             <a:r>
               <a:rPr lang="en-US" dirty="0"/>
               <a:t>Map of NYC + 10 busy stations</a:t>
+            </a:r>
+          </a:p>
+          <a:p>
+            <a:r>
+              <a:rPr lang="en-US" dirty="0"/>
+              <a:t>Traffic = entries + exits</a:t>
             </a:r>
           </a:p>
         </p:txBody>
@@ -5031,7 +5368,7 @@
 </p:sld>
 </file>
 
-<file path=ppt/slides/slide5.xml><?xml version="1.0" encoding="utf-8"?>
+<file path=ppt/slides/slide6.xml><?xml version="1.0" encoding="utf-8"?>
 <p:sld xmlns:a="http://schemas.openxmlformats.org/drawingml/2006/main" xmlns:r="http://schemas.openxmlformats.org/officeDocument/2006/relationships" xmlns:p="http://schemas.openxmlformats.org/presentationml/2006/main">
   <p:cSld>
     <p:spTree>
@@ -5203,7 +5540,7 @@
 </p:sld>
 </file>
 
-<file path=ppt/slides/slide6.xml><?xml version="1.0" encoding="utf-8"?>
+<file path=ppt/slides/slide7.xml><?xml version="1.0" encoding="utf-8"?>
 <p:sld xmlns:a="http://schemas.openxmlformats.org/drawingml/2006/main" xmlns:r="http://schemas.openxmlformats.org/officeDocument/2006/relationships" xmlns:p="http://schemas.openxmlformats.org/presentationml/2006/main">
   <p:cSld>
     <p:spTree>
@@ -5264,7 +5601,12 @@
             <p:ph idx="1"/>
           </p:nvPr>
         </p:nvSpPr>
-        <p:spPr/>
+        <p:spPr>
+          <a:xfrm>
+            <a:off x="838200" y="1690687"/>
+            <a:ext cx="10515600" cy="4486275"/>
+          </a:xfrm>
+        </p:spPr>
         <p:txBody>
           <a:bodyPr/>
           <a:lstStyle/>
@@ -5972,7 +6314,7 @@
 </p:sld>
 </file>
 
-<file path=ppt/slides/slide7.xml><?xml version="1.0" encoding="utf-8"?>
+<file path=ppt/slides/slide8.xml><?xml version="1.0" encoding="utf-8"?>
 <p:sld xmlns:a="http://schemas.openxmlformats.org/drawingml/2006/main" xmlns:r="http://schemas.openxmlformats.org/officeDocument/2006/relationships" xmlns:p="http://schemas.openxmlformats.org/presentationml/2006/main">
   <p:cSld>
     <p:spTree>
@@ -6118,89 +6460,6 @@
 </p:sld>
 </file>
 
-<file path=ppt/slides/slide8.xml><?xml version="1.0" encoding="utf-8"?>
-<p:sld xmlns:a="http://schemas.openxmlformats.org/drawingml/2006/main" xmlns:r="http://schemas.openxmlformats.org/officeDocument/2006/relationships" xmlns:p="http://schemas.openxmlformats.org/presentationml/2006/main">
-  <p:cSld>
-    <p:spTree>
-      <p:nvGrpSpPr>
-        <p:cNvPr id="1" name=""/>
-        <p:cNvGrpSpPr/>
-        <p:nvPr/>
-      </p:nvGrpSpPr>
-      <p:grpSpPr>
-        <a:xfrm>
-          <a:off x="0" y="0"/>
-          <a:ext cx="0" cy="0"/>
-          <a:chOff x="0" y="0"/>
-          <a:chExt cx="0" cy="0"/>
-        </a:xfrm>
-      </p:grpSpPr>
-      <p:sp>
-        <p:nvSpPr>
-          <p:cNvPr id="2" name="Title 1">
-            <a:extLst>
-              <a:ext uri="{FF2B5EF4-FFF2-40B4-BE49-F238E27FC236}">
-                <a16:creationId xmlns:a16="http://schemas.microsoft.com/office/drawing/2014/main" id="{BD80C007-3B6C-C34A-951A-775C23A2E442}"/>
-              </a:ext>
-            </a:extLst>
-          </p:cNvPr>
-          <p:cNvSpPr>
-            <a:spLocks noGrp="1"/>
-          </p:cNvSpPr>
-          <p:nvPr>
-            <p:ph type="title"/>
-          </p:nvPr>
-        </p:nvSpPr>
-        <p:spPr/>
-        <p:txBody>
-          <a:bodyPr/>
-          <a:lstStyle/>
-          <a:p>
-            <a:r>
-              <a:rPr lang="en-US" dirty="0"/>
-              <a:t>Passionate crowd</a:t>
-            </a:r>
-          </a:p>
-        </p:txBody>
-      </p:sp>
-      <p:sp>
-        <p:nvSpPr>
-          <p:cNvPr id="3" name="Text Placeholder 2">
-            <a:extLst>
-              <a:ext uri="{FF2B5EF4-FFF2-40B4-BE49-F238E27FC236}">
-                <a16:creationId xmlns:a16="http://schemas.microsoft.com/office/drawing/2014/main" id="{766D1216-1595-B741-887F-43AC6439A524}"/>
-              </a:ext>
-            </a:extLst>
-          </p:cNvPr>
-          <p:cNvSpPr>
-            <a:spLocks noGrp="1"/>
-          </p:cNvSpPr>
-          <p:nvPr>
-            <p:ph type="body" idx="1"/>
-          </p:nvPr>
-        </p:nvSpPr>
-        <p:spPr/>
-        <p:txBody>
-          <a:bodyPr/>
-          <a:lstStyle/>
-          <a:p>
-            <a:endParaRPr lang="en-US"/>
-          </a:p>
-        </p:txBody>
-      </p:sp>
-    </p:spTree>
-    <p:extLst>
-      <p:ext uri="{BB962C8B-B14F-4D97-AF65-F5344CB8AC3E}">
-        <p14:creationId xmlns:p14="http://schemas.microsoft.com/office/powerpoint/2010/main" val="2103366297"/>
-      </p:ext>
-    </p:extLst>
-  </p:cSld>
-  <p:clrMapOvr>
-    <a:masterClrMapping/>
-  </p:clrMapOvr>
-</p:sld>
-</file>
-
 <file path=ppt/slides/slide9.xml><?xml version="1.0" encoding="utf-8"?>
 <p:sld xmlns:a="http://schemas.openxmlformats.org/drawingml/2006/main" xmlns:r="http://schemas.openxmlformats.org/officeDocument/2006/relationships" xmlns:p="http://schemas.openxmlformats.org/presentationml/2006/main">
   <p:cSld>
@@ -6223,7 +6482,7 @@
           <p:cNvPr id="2" name="Title 1">
             <a:extLst>
               <a:ext uri="{FF2B5EF4-FFF2-40B4-BE49-F238E27FC236}">
-                <a16:creationId xmlns:a16="http://schemas.microsoft.com/office/drawing/2014/main" id="{3A7C735F-F13E-914E-9DF6-F21C621A14CD}"/>
+                <a16:creationId xmlns:a16="http://schemas.microsoft.com/office/drawing/2014/main" id="{BD80C007-3B6C-C34A-951A-775C23A2E442}"/>
               </a:ext>
             </a:extLst>
           </p:cNvPr>
@@ -6241,146 +6500,40 @@
           <a:p>
             <a:r>
               <a:rPr lang="en-US" dirty="0"/>
-              <a:t>Who loves galas!</a:t>
-            </a:r>
-          </a:p>
-        </p:txBody>
-      </p:sp>
-      <p:pic>
-        <p:nvPicPr>
-          <p:cNvPr id="5" name="Picture 4">
-            <a:extLst>
-              <a:ext uri="{FF2B5EF4-FFF2-40B4-BE49-F238E27FC236}">
-                <a16:creationId xmlns:a16="http://schemas.microsoft.com/office/drawing/2014/main" id="{2708C00D-9E06-A94A-B4FC-95E4C9DB326D}"/>
-              </a:ext>
-            </a:extLst>
-          </p:cNvPr>
-          <p:cNvPicPr>
-            <a:picLocks noChangeAspect="1"/>
-          </p:cNvPicPr>
-          <p:nvPr/>
-        </p:nvPicPr>
-        <p:blipFill>
-          <a:blip r:embed="rId2">
-            <a:alphaModFix amt="51000"/>
-          </a:blip>
-          <a:stretch>
-            <a:fillRect/>
-          </a:stretch>
-        </p:blipFill>
-        <p:spPr>
-          <a:xfrm>
-            <a:off x="6677525" y="700159"/>
-            <a:ext cx="5105400" cy="5804913"/>
-          </a:xfrm>
-          <a:prstGeom prst="rect">
-            <a:avLst/>
-          </a:prstGeom>
-        </p:spPr>
-      </p:pic>
-      <p:sp>
-        <p:nvSpPr>
-          <p:cNvPr id="6" name="Rectangle 5">
-            <a:extLst>
-              <a:ext uri="{FF2B5EF4-FFF2-40B4-BE49-F238E27FC236}">
-                <a16:creationId xmlns:a16="http://schemas.microsoft.com/office/drawing/2014/main" id="{E59A46B5-6D6D-6C43-BB51-11E6B3645423}"/>
-              </a:ext>
-            </a:extLst>
-          </p:cNvPr>
-          <p:cNvSpPr/>
-          <p:nvPr/>
-        </p:nvSpPr>
-        <p:spPr>
-          <a:xfrm>
-            <a:off x="6677525" y="700159"/>
-            <a:ext cx="5105400" cy="5804913"/>
-          </a:xfrm>
-          <a:prstGeom prst="rect">
-            <a:avLst/>
-          </a:prstGeom>
-          <a:solidFill>
-            <a:schemeClr val="accent6">
-              <a:lumMod val="60000"/>
-              <a:lumOff val="40000"/>
-              <a:alpha val="39000"/>
-            </a:schemeClr>
-          </a:solidFill>
-          <a:ln>
-            <a:noFill/>
-          </a:ln>
-        </p:spPr>
-        <p:style>
-          <a:lnRef idx="2">
-            <a:schemeClr val="accent1">
-              <a:shade val="50000"/>
-            </a:schemeClr>
-          </a:lnRef>
-          <a:fillRef idx="1">
-            <a:schemeClr val="accent1"/>
-          </a:fillRef>
-          <a:effectRef idx="0">
-            <a:schemeClr val="accent1"/>
-          </a:effectRef>
-          <a:fontRef idx="minor">
-            <a:schemeClr val="lt1"/>
-          </a:fontRef>
-        </p:style>
-        <p:txBody>
-          <a:bodyPr rtlCol="0" anchor="ctr"/>
-          <a:lstStyle/>
-          <a:p>
-            <a:pPr algn="ctr"/>
+              <a:t>Passionate crowd</a:t>
+            </a:r>
+          </a:p>
+        </p:txBody>
+      </p:sp>
+      <p:sp>
+        <p:nvSpPr>
+          <p:cNvPr id="3" name="Text Placeholder 2">
+            <a:extLst>
+              <a:ext uri="{FF2B5EF4-FFF2-40B4-BE49-F238E27FC236}">
+                <a16:creationId xmlns:a16="http://schemas.microsoft.com/office/drawing/2014/main" id="{766D1216-1595-B741-887F-43AC6439A524}"/>
+              </a:ext>
+            </a:extLst>
+          </p:cNvPr>
+          <p:cNvSpPr>
+            <a:spLocks noGrp="1"/>
+          </p:cNvSpPr>
+          <p:nvPr>
+            <p:ph type="body" idx="1"/>
+          </p:nvPr>
+        </p:nvSpPr>
+        <p:spPr/>
+        <p:txBody>
+          <a:bodyPr/>
+          <a:lstStyle/>
+          <a:p>
             <a:endParaRPr lang="en-US"/>
-          </a:p>
-        </p:txBody>
-      </p:sp>
-      <p:sp>
-        <p:nvSpPr>
-          <p:cNvPr id="3" name="Content Placeholder 2">
-            <a:extLst>
-              <a:ext uri="{FF2B5EF4-FFF2-40B4-BE49-F238E27FC236}">
-                <a16:creationId xmlns:a16="http://schemas.microsoft.com/office/drawing/2014/main" id="{EF829C52-42D1-F84E-80E7-E475E1E9FD8B}"/>
-              </a:ext>
-            </a:extLst>
-          </p:cNvPr>
-          <p:cNvSpPr>
-            <a:spLocks noGrp="1"/>
-          </p:cNvSpPr>
-          <p:nvPr>
-            <p:ph idx="1"/>
-          </p:nvPr>
-        </p:nvSpPr>
-        <p:spPr/>
-        <p:txBody>
-          <a:bodyPr/>
-          <a:lstStyle/>
-          <a:p>
-            <a:r>
-              <a:rPr lang="en-US" dirty="0"/>
-              <a:t>Cost of living in NYC</a:t>
-            </a:r>
-          </a:p>
-          <a:p>
-            <a:r>
-              <a:rPr lang="en-US" dirty="0"/>
-              <a:t>Bar chart of (zip code, count of income&gt;75k)</a:t>
-            </a:r>
-          </a:p>
-          <a:p>
-            <a:r>
-              <a:rPr lang="en-US" dirty="0"/>
-              <a:t>Map of NYC + highest income areas</a:t>
-            </a:r>
-          </a:p>
-          <a:p>
-            <a:endParaRPr lang="en-US" dirty="0"/>
           </a:p>
         </p:txBody>
       </p:sp>
     </p:spTree>
     <p:extLst>
       <p:ext uri="{BB962C8B-B14F-4D97-AF65-F5344CB8AC3E}">
-        <p14:creationId xmlns:p14="http://schemas.microsoft.com/office/powerpoint/2010/main" val="4150064823"/>
+        <p14:creationId xmlns:p14="http://schemas.microsoft.com/office/powerpoint/2010/main" val="2103366297"/>
       </p:ext>
     </p:extLst>
   </p:cSld>

</xml_diff>